<commit_message>
1) finished implementation of repository 2) finished implementation of classloading in the app server 3) finished implementation of Java clients for the repository and the app server 3) renamed project documents
</commit_message>
<xml_diff>
--- a/docs/presentations/Grading Ecosystem - Overview.pptx
+++ b/docs/presentations/Grading Ecosystem - Overview.pptx
@@ -6,7 +6,21 @@
   </p:sldMasterIdLst>
   <p:sldIdLst>
     <p:sldId id="256" r:id="rId2"/>
-    <p:sldId id="257" r:id="rId3"/>
+    <p:sldId id="259" r:id="rId3"/>
+    <p:sldId id="260" r:id="rId4"/>
+    <p:sldId id="263" r:id="rId5"/>
+    <p:sldId id="261" r:id="rId6"/>
+    <p:sldId id="264" r:id="rId7"/>
+    <p:sldId id="266" r:id="rId8"/>
+    <p:sldId id="267" r:id="rId9"/>
+    <p:sldId id="274" r:id="rId10"/>
+    <p:sldId id="268" r:id="rId11"/>
+    <p:sldId id="269" r:id="rId12"/>
+    <p:sldId id="270" r:id="rId13"/>
+    <p:sldId id="271" r:id="rId14"/>
+    <p:sldId id="272" r:id="rId15"/>
+    <p:sldId id="262" r:id="rId16"/>
+    <p:sldId id="265" r:id="rId17"/>
   </p:sldIdLst>
   <p:sldSz cx="9144000" cy="6858000" type="screen4x3"/>
   <p:notesSz cx="6858000" cy="9144000"/>
@@ -290,7 +304,7 @@
             <a:fld id="{1D8BD707-D9CF-40AE-B4C6-C98DA3205C09}" type="datetimeFigureOut">
               <a:rPr lang="en-US" smtClean="0"/>
               <a:pPr/>
-              <a:t>6/1/2013</a:t>
+              <a:t>10/27/2013</a:t>
             </a:fld>
             <a:endParaRPr lang="en-US"/>
           </a:p>
@@ -344,6 +358,13 @@
   <p:clrMapOvr>
     <a:masterClrMapping/>
   </p:clrMapOvr>
+  <p:timing>
+    <p:tnLst>
+      <p:par>
+        <p:cTn id="1" dur="indefinite" restart="never" nodeType="tmRoot"/>
+      </p:par>
+    </p:tnLst>
+  </p:timing>
 </p:sldLayout>
 </file>
 
@@ -457,7 +478,7 @@
             <a:fld id="{1D8BD707-D9CF-40AE-B4C6-C98DA3205C09}" type="datetimeFigureOut">
               <a:rPr lang="en-US" smtClean="0"/>
               <a:pPr/>
-              <a:t>6/1/2013</a:t>
+              <a:t>10/27/2013</a:t>
             </a:fld>
             <a:endParaRPr lang="en-US"/>
           </a:p>
@@ -634,7 +655,7 @@
             <a:fld id="{1D8BD707-D9CF-40AE-B4C6-C98DA3205C09}" type="datetimeFigureOut">
               <a:rPr lang="en-US" smtClean="0"/>
               <a:pPr/>
-              <a:t>6/1/2013</a:t>
+              <a:t>10/27/2013</a:t>
             </a:fld>
             <a:endParaRPr lang="en-US"/>
           </a:p>
@@ -801,7 +822,7 @@
             <a:fld id="{1D8BD707-D9CF-40AE-B4C6-C98DA3205C09}" type="datetimeFigureOut">
               <a:rPr lang="en-US" smtClean="0"/>
               <a:pPr/>
-              <a:t>6/1/2013</a:t>
+              <a:t>10/27/2013</a:t>
             </a:fld>
             <a:endParaRPr lang="en-US"/>
           </a:p>
@@ -1044,7 +1065,7 @@
             <a:fld id="{1D8BD707-D9CF-40AE-B4C6-C98DA3205C09}" type="datetimeFigureOut">
               <a:rPr lang="en-US" smtClean="0"/>
               <a:pPr/>
-              <a:t>6/1/2013</a:t>
+              <a:t>10/27/2013</a:t>
             </a:fld>
             <a:endParaRPr lang="en-US"/>
           </a:p>
@@ -1329,7 +1350,7 @@
             <a:fld id="{1D8BD707-D9CF-40AE-B4C6-C98DA3205C09}" type="datetimeFigureOut">
               <a:rPr lang="en-US" smtClean="0"/>
               <a:pPr/>
-              <a:t>6/1/2013</a:t>
+              <a:t>10/27/2013</a:t>
             </a:fld>
             <a:endParaRPr lang="en-US"/>
           </a:p>
@@ -1748,7 +1769,7 @@
             <a:fld id="{1D8BD707-D9CF-40AE-B4C6-C98DA3205C09}" type="datetimeFigureOut">
               <a:rPr lang="en-US" smtClean="0"/>
               <a:pPr/>
-              <a:t>6/1/2013</a:t>
+              <a:t>10/27/2013</a:t>
             </a:fld>
             <a:endParaRPr lang="en-US"/>
           </a:p>
@@ -1863,7 +1884,7 @@
             <a:fld id="{1D8BD707-D9CF-40AE-B4C6-C98DA3205C09}" type="datetimeFigureOut">
               <a:rPr lang="en-US" smtClean="0"/>
               <a:pPr/>
-              <a:t>6/1/2013</a:t>
+              <a:t>10/27/2013</a:t>
             </a:fld>
             <a:endParaRPr lang="en-US"/>
           </a:p>
@@ -1955,7 +1976,7 @@
             <a:fld id="{1D8BD707-D9CF-40AE-B4C6-C98DA3205C09}" type="datetimeFigureOut">
               <a:rPr lang="en-US" smtClean="0"/>
               <a:pPr/>
-              <a:t>6/1/2013</a:t>
+              <a:t>10/27/2013</a:t>
             </a:fld>
             <a:endParaRPr lang="en-US"/>
           </a:p>
@@ -2229,7 +2250,7 @@
             <a:fld id="{1D8BD707-D9CF-40AE-B4C6-C98DA3205C09}" type="datetimeFigureOut">
               <a:rPr lang="en-US" smtClean="0"/>
               <a:pPr/>
-              <a:t>6/1/2013</a:t>
+              <a:t>10/27/2013</a:t>
             </a:fld>
             <a:endParaRPr lang="en-US"/>
           </a:p>
@@ -2479,7 +2500,7 @@
             <a:fld id="{1D8BD707-D9CF-40AE-B4C6-C98DA3205C09}" type="datetimeFigureOut">
               <a:rPr lang="en-US" smtClean="0"/>
               <a:pPr/>
-              <a:t>6/1/2013</a:t>
+              <a:t>10/27/2013</a:t>
             </a:fld>
             <a:endParaRPr lang="en-US"/>
           </a:p>
@@ -2689,7 +2710,7 @@
             <a:fld id="{1D8BD707-D9CF-40AE-B4C6-C98DA3205C09}" type="datetimeFigureOut">
               <a:rPr lang="en-US" smtClean="0"/>
               <a:pPr/>
-              <a:t>6/1/2013</a:t>
+              <a:t>10/27/2013</a:t>
             </a:fld>
             <a:endParaRPr lang="en-US"/>
           </a:p>
@@ -2774,6 +2795,47 @@
           </a:p>
         </p:txBody>
       </p:sp>
+      <p:pic>
+        <p:nvPicPr>
+          <p:cNvPr id="7" name="Picture 2" descr="D:\stuff\study\Masters of Parallel Systems and Mobile Technologies\diploma_project\grading_ecosystem\docs\tech\resources\sofia_university.gif"/>
+          <p:cNvPicPr>
+            <a:picLocks noChangeAspect="1" noChangeArrowheads="1"/>
+          </p:cNvPicPr>
+          <p:nvPr userDrawn="1"/>
+        </p:nvPicPr>
+        <p:blipFill>
+          <a:blip r:embed="rId13" cstate="print">
+            <a:extLst>
+              <a:ext uri="{28A0092B-C50C-407E-A947-70E740481C1C}">
+                <a14:useLocalDpi xmlns:a14="http://schemas.microsoft.com/office/drawing/2010/main" val="0"/>
+              </a:ext>
+            </a:extLst>
+          </a:blip>
+          <a:srcRect/>
+          <a:stretch>
+            <a:fillRect/>
+          </a:stretch>
+        </p:blipFill>
+        <p:spPr bwMode="auto">
+          <a:xfrm>
+            <a:off x="7873999" y="5486400"/>
+            <a:ext cx="1117599" cy="1218587"/>
+          </a:xfrm>
+          <a:prstGeom prst="rect">
+            <a:avLst/>
+          </a:prstGeom>
+          <a:noFill/>
+          <a:extLst>
+            <a:ext uri="{909E8E84-426E-40DD-AFC4-6F175D3DCCD1}">
+              <a14:hiddenFill xmlns:a14="http://schemas.microsoft.com/office/drawing/2010/main">
+                <a:solidFill>
+                  <a:srgbClr val="FFFFFF"/>
+                </a:solidFill>
+              </a14:hiddenFill>
+            </a:ext>
+          </a:extLst>
+        </p:spPr>
+      </p:pic>
     </p:spTree>
   </p:cSld>
   <p:clrMap bg1="lt1" tx1="dk1" bg2="lt2" tx2="dk2" accent1="accent1" accent2="accent2" accent3="accent3" accent4="accent4" accent5="accent5" accent6="accent6" hlink="hlink" folHlink="folHlink"/>
@@ -2790,6 +2852,13 @@
     <p:sldLayoutId id="2147483658" r:id="rId10"/>
     <p:sldLayoutId id="2147483659" r:id="rId11"/>
   </p:sldLayoutIdLst>
+  <p:timing>
+    <p:tnLst>
+      <p:par>
+        <p:cTn id="1" dur="indefinite" restart="never" nodeType="tmRoot"/>
+      </p:par>
+    </p:tnLst>
+  </p:timing>
   <p:txStyles>
     <p:titleStyle>
       <a:lvl1pPr algn="ctr" defTabSz="914400" rtl="0" eaLnBrk="1" latinLnBrk="0" hangingPunct="1">
@@ -3075,6 +3144,20 @@
           <a:bodyPr/>
           <a:lstStyle/>
           <a:p>
+            <a:r>
+              <a:rPr lang="ru-RU" dirty="0"/>
+              <a:t>Интегриране на състезателните оценяващи системи за </a:t>
+            </a:r>
+            <a:br>
+              <a:rPr lang="ru-RU" dirty="0"/>
+            </a:br>
+            <a:r>
+              <a:rPr lang="ru-RU" dirty="0"/>
+              <a:t>нуждите на процеса на обучение по програмиране </a:t>
+            </a:r>
+            <a:br>
+              <a:rPr lang="ru-RU" dirty="0"/>
+            </a:br>
             <a:endParaRPr lang="bg-BG" dirty="0"/>
           </a:p>
         </p:txBody>
@@ -3089,12 +3172,49 @@
             <p:ph type="subTitle" idx="1"/>
           </p:nvPr>
         </p:nvSpPr>
-        <p:spPr/>
-        <p:txBody>
-          <a:bodyPr/>
-          <a:lstStyle/>
-          <a:p>
-            <a:endParaRPr lang="bg-BG"/>
+        <p:spPr>
+          <a:xfrm>
+            <a:off x="457200" y="4038600"/>
+            <a:ext cx="7239000" cy="2590800"/>
+          </a:xfrm>
+        </p:spPr>
+        <p:txBody>
+          <a:bodyPr/>
+          <a:lstStyle/>
+          <a:p>
+            <a:pPr algn="l"/>
+            <a:endParaRPr lang="bg-BG" dirty="0" smtClean="0"/>
+          </a:p>
+          <a:p>
+            <a:pPr algn="l"/>
+            <a:r>
+              <a:rPr lang="bg-BG" dirty="0" smtClean="0"/>
+              <a:t>д-р Георги Георгиев</a:t>
+            </a:r>
+            <a:endParaRPr lang="bg-BG" dirty="0" smtClean="0"/>
+          </a:p>
+          <a:p>
+            <a:pPr algn="l"/>
+            <a:r>
+              <a:rPr lang="bg-BG" dirty="0" smtClean="0"/>
+              <a:t>Мартин </a:t>
+            </a:r>
+            <a:r>
+              <a:rPr lang="bg-BG" dirty="0" smtClean="0"/>
+              <a:t>Тошев</a:t>
+            </a:r>
+          </a:p>
+          <a:p>
+            <a:pPr algn="l"/>
+            <a:r>
+              <a:rPr lang="bg-BG" dirty="0" smtClean="0"/>
+              <a:t>Орлин </a:t>
+            </a:r>
+            <a:r>
+              <a:rPr lang="bg-BG" dirty="0" smtClean="0"/>
+              <a:t>Тенчев</a:t>
+            </a:r>
+            <a:endParaRPr lang="en-US" dirty="0" smtClean="0"/>
           </a:p>
         </p:txBody>
       </p:sp>
@@ -3108,6 +3228,966 @@
   <p:clrMapOvr>
     <a:masterClrMapping/>
   </p:clrMapOvr>
+  <p:timing>
+    <p:tnLst>
+      <p:par>
+        <p:cTn id="1" dur="indefinite" restart="never" nodeType="tmRoot"/>
+      </p:par>
+    </p:tnLst>
+  </p:timing>
+</p:sld>
+</file>
+
+<file path=ppt/slides/slide10.xml><?xml version="1.0" encoding="utf-8"?>
+<p:sld xmlns:a="http://schemas.openxmlformats.org/drawingml/2006/main" xmlns:r="http://schemas.openxmlformats.org/officeDocument/2006/relationships" xmlns:p="http://schemas.openxmlformats.org/presentationml/2006/main">
+  <p:cSld>
+    <p:spTree>
+      <p:nvGrpSpPr>
+        <p:cNvPr id="1" name=""/>
+        <p:cNvGrpSpPr/>
+        <p:nvPr/>
+      </p:nvGrpSpPr>
+      <p:grpSpPr>
+        <a:xfrm>
+          <a:off x="0" y="0"/>
+          <a:ext cx="0" cy="0"/>
+          <a:chOff x="0" y="0"/>
+          <a:chExt cx="0" cy="0"/>
+        </a:xfrm>
+      </p:grpSpPr>
+      <p:sp>
+        <p:nvSpPr>
+          <p:cNvPr id="2" name="Title 1"/>
+          <p:cNvSpPr>
+            <a:spLocks noGrp="1"/>
+          </p:cNvSpPr>
+          <p:nvPr>
+            <p:ph type="title"/>
+          </p:nvPr>
+        </p:nvSpPr>
+        <p:spPr/>
+        <p:txBody>
+          <a:bodyPr>
+            <a:normAutofit/>
+          </a:bodyPr>
+          <a:lstStyle/>
+          <a:p>
+            <a:r>
+              <a:rPr lang="bg-BG" dirty="0"/>
+              <a:t>Реализация на проекта</a:t>
+            </a:r>
+          </a:p>
+        </p:txBody>
+      </p:sp>
+      <p:sp>
+        <p:nvSpPr>
+          <p:cNvPr id="3" name="Content Placeholder 2"/>
+          <p:cNvSpPr>
+            <a:spLocks noGrp="1"/>
+          </p:cNvSpPr>
+          <p:nvPr>
+            <p:ph idx="1"/>
+          </p:nvPr>
+        </p:nvSpPr>
+        <p:spPr/>
+        <p:txBody>
+          <a:bodyPr/>
+          <a:lstStyle/>
+          <a:p>
+            <a:r>
+              <a:rPr lang="bg-BG" dirty="0" smtClean="0"/>
+              <a:t>Разширения на съществуващите системи:</a:t>
+            </a:r>
+            <a:endParaRPr lang="en-US" dirty="0" smtClean="0"/>
+          </a:p>
+          <a:p>
+            <a:endParaRPr lang="en-US" dirty="0"/>
+          </a:p>
+          <a:p>
+            <a:pPr marL="0" indent="0">
+              <a:buNone/>
+            </a:pPr>
+            <a:r>
+              <a:rPr lang="bg-BG" dirty="0" smtClean="0"/>
+              <a:t>	- </a:t>
+            </a:r>
+            <a:r>
+              <a:rPr lang="en-US" dirty="0" smtClean="0"/>
+              <a:t>Spoj0 - REST</a:t>
+            </a:r>
+            <a:r>
+              <a:rPr lang="bg-BG" dirty="0" smtClean="0"/>
+              <a:t>-базирани уеб услуги на </a:t>
+            </a:r>
+            <a:r>
+              <a:rPr lang="en-US" dirty="0" smtClean="0"/>
+              <a:t>	Perl </a:t>
+            </a:r>
+            <a:r>
+              <a:rPr lang="bg-BG" dirty="0" smtClean="0"/>
+              <a:t>с уеб</a:t>
+            </a:r>
+            <a:r>
+              <a:rPr lang="en-US" dirty="0" smtClean="0"/>
+              <a:t> </a:t>
+            </a:r>
+            <a:r>
+              <a:rPr lang="bg-BG" dirty="0" smtClean="0"/>
+              <a:t>платформата </a:t>
+            </a:r>
+            <a:r>
+              <a:rPr lang="en-US" dirty="0" smtClean="0"/>
+              <a:t>Dancer</a:t>
+            </a:r>
+          </a:p>
+          <a:p>
+            <a:pPr marL="0" indent="0">
+              <a:buNone/>
+            </a:pPr>
+            <a:endParaRPr lang="en-US" dirty="0" smtClean="0"/>
+          </a:p>
+          <a:p>
+            <a:pPr marL="0" indent="0">
+              <a:buNone/>
+            </a:pPr>
+            <a:r>
+              <a:rPr lang="bg-BG" dirty="0"/>
+              <a:t>	- </a:t>
+            </a:r>
+            <a:r>
+              <a:rPr lang="en-US" dirty="0" err="1" smtClean="0"/>
+              <a:t>Maycamp</a:t>
+            </a:r>
+            <a:r>
+              <a:rPr lang="en-US" dirty="0" smtClean="0"/>
+              <a:t> </a:t>
+            </a:r>
+            <a:r>
+              <a:rPr lang="en-US" dirty="0"/>
+              <a:t>- REST</a:t>
+            </a:r>
+            <a:r>
+              <a:rPr lang="bg-BG" dirty="0"/>
+              <a:t>-базирани уеб услуги на </a:t>
+            </a:r>
+            <a:r>
+              <a:rPr lang="en-US" dirty="0" smtClean="0"/>
+              <a:t>	Rails </a:t>
+            </a:r>
+            <a:r>
+              <a:rPr lang="bg-BG" dirty="0"/>
+              <a:t>с </a:t>
+            </a:r>
+            <a:r>
+              <a:rPr lang="bg-BG" dirty="0" smtClean="0"/>
+              <a:t>библиотеката </a:t>
+            </a:r>
+            <a:r>
+              <a:rPr lang="en-US" dirty="0" err="1" smtClean="0"/>
+              <a:t>ActiveResource</a:t>
+            </a:r>
+            <a:endParaRPr lang="en-US" dirty="0"/>
+          </a:p>
+          <a:p>
+            <a:pPr marL="0" indent="0">
+              <a:buNone/>
+            </a:pPr>
+            <a:endParaRPr lang="en-US" dirty="0" smtClean="0"/>
+          </a:p>
+          <a:p>
+            <a:pPr marL="0" indent="0">
+              <a:buNone/>
+            </a:pPr>
+            <a:endParaRPr lang="en-US" dirty="0"/>
+          </a:p>
+          <a:p>
+            <a:pPr marL="0" indent="0">
+              <a:buNone/>
+            </a:pPr>
+            <a:endParaRPr lang="en-US" dirty="0" smtClean="0"/>
+          </a:p>
+          <a:p>
+            <a:pPr marL="0" indent="0">
+              <a:buNone/>
+            </a:pPr>
+            <a:endParaRPr lang="en-US" dirty="0" smtClean="0"/>
+          </a:p>
+          <a:p>
+            <a:pPr marL="0" indent="0">
+              <a:buNone/>
+            </a:pPr>
+            <a:endParaRPr lang="en-US" dirty="0" smtClean="0"/>
+          </a:p>
+          <a:p>
+            <a:pPr marL="0" indent="0">
+              <a:buNone/>
+            </a:pPr>
+            <a:endParaRPr lang="bg-BG" dirty="0"/>
+          </a:p>
+        </p:txBody>
+      </p:sp>
+    </p:spTree>
+    <p:extLst>
+      <p:ext uri="{BB962C8B-B14F-4D97-AF65-F5344CB8AC3E}">
+        <p14:creationId xmlns:p14="http://schemas.microsoft.com/office/powerpoint/2010/main" val="3048742943"/>
+      </p:ext>
+    </p:extLst>
+  </p:cSld>
+  <p:clrMapOvr>
+    <a:masterClrMapping/>
+  </p:clrMapOvr>
+  <p:timing>
+    <p:tnLst>
+      <p:par>
+        <p:cTn id="1" dur="indefinite" restart="never" nodeType="tmRoot"/>
+      </p:par>
+    </p:tnLst>
+  </p:timing>
+</p:sld>
+</file>
+
+<file path=ppt/slides/slide11.xml><?xml version="1.0" encoding="utf-8"?>
+<p:sld xmlns:a="http://schemas.openxmlformats.org/drawingml/2006/main" xmlns:r="http://schemas.openxmlformats.org/officeDocument/2006/relationships" xmlns:p="http://schemas.openxmlformats.org/presentationml/2006/main">
+  <p:cSld>
+    <p:spTree>
+      <p:nvGrpSpPr>
+        <p:cNvPr id="1" name=""/>
+        <p:cNvGrpSpPr/>
+        <p:nvPr/>
+      </p:nvGrpSpPr>
+      <p:grpSpPr>
+        <a:xfrm>
+          <a:off x="0" y="0"/>
+          <a:ext cx="0" cy="0"/>
+          <a:chOff x="0" y="0"/>
+          <a:chExt cx="0" cy="0"/>
+        </a:xfrm>
+      </p:grpSpPr>
+      <p:sp>
+        <p:nvSpPr>
+          <p:cNvPr id="2" name="Title 1"/>
+          <p:cNvSpPr>
+            <a:spLocks noGrp="1"/>
+          </p:cNvSpPr>
+          <p:nvPr>
+            <p:ph type="title"/>
+          </p:nvPr>
+        </p:nvSpPr>
+        <p:spPr/>
+        <p:txBody>
+          <a:bodyPr>
+            <a:normAutofit/>
+          </a:bodyPr>
+          <a:lstStyle/>
+          <a:p>
+            <a:r>
+              <a:rPr lang="bg-BG" dirty="0"/>
+              <a:t>Реализация на проекта</a:t>
+            </a:r>
+          </a:p>
+        </p:txBody>
+      </p:sp>
+      <p:sp>
+        <p:nvSpPr>
+          <p:cNvPr id="3" name="Content Placeholder 2"/>
+          <p:cNvSpPr>
+            <a:spLocks noGrp="1"/>
+          </p:cNvSpPr>
+          <p:nvPr>
+            <p:ph idx="1"/>
+          </p:nvPr>
+        </p:nvSpPr>
+        <p:spPr/>
+        <p:txBody>
+          <a:bodyPr/>
+          <a:lstStyle/>
+          <a:p>
+            <a:r>
+              <a:rPr lang="bg-BG" dirty="0" smtClean="0"/>
+              <a:t>Административен интерфейс:</a:t>
+            </a:r>
+            <a:endParaRPr lang="en-US" dirty="0" smtClean="0"/>
+          </a:p>
+          <a:p>
+            <a:endParaRPr lang="en-US" dirty="0"/>
+          </a:p>
+          <a:p>
+            <a:endParaRPr lang="bg-BG" dirty="0"/>
+          </a:p>
+        </p:txBody>
+      </p:sp>
+      <p:pic>
+        <p:nvPicPr>
+          <p:cNvPr id="13315" name="Picture 3"/>
+          <p:cNvPicPr>
+            <a:picLocks noChangeAspect="1" noChangeArrowheads="1"/>
+          </p:cNvPicPr>
+          <p:nvPr/>
+        </p:nvPicPr>
+        <p:blipFill>
+          <a:blip r:embed="rId2">
+            <a:extLst>
+              <a:ext uri="{28A0092B-C50C-407E-A947-70E740481C1C}">
+                <a14:useLocalDpi xmlns:a14="http://schemas.microsoft.com/office/drawing/2010/main" val="0"/>
+              </a:ext>
+            </a:extLst>
+          </a:blip>
+          <a:srcRect/>
+          <a:stretch>
+            <a:fillRect/>
+          </a:stretch>
+        </p:blipFill>
+        <p:spPr bwMode="auto">
+          <a:xfrm>
+            <a:off x="2657475" y="2881313"/>
+            <a:ext cx="3829050" cy="1095375"/>
+          </a:xfrm>
+          <a:prstGeom prst="rect">
+            <a:avLst/>
+          </a:prstGeom>
+          <a:noFill/>
+          <a:ln>
+            <a:noFill/>
+          </a:ln>
+          <a:extLst>
+            <a:ext uri="{909E8E84-426E-40DD-AFC4-6F175D3DCCD1}">
+              <a14:hiddenFill xmlns:a14="http://schemas.microsoft.com/office/drawing/2010/main">
+                <a:solidFill>
+                  <a:schemeClr val="accent1"/>
+                </a:solidFill>
+              </a14:hiddenFill>
+            </a:ext>
+            <a:ext uri="{91240B29-F687-4F45-9708-019B960494DF}">
+              <a14:hiddenLine xmlns:a14="http://schemas.microsoft.com/office/drawing/2010/main" w="9525">
+                <a:solidFill>
+                  <a:schemeClr val="tx1"/>
+                </a:solidFill>
+                <a:miter lim="800000"/>
+                <a:headEnd/>
+                <a:tailEnd/>
+              </a14:hiddenLine>
+            </a:ext>
+          </a:extLst>
+        </p:spPr>
+      </p:pic>
+    </p:spTree>
+    <p:extLst>
+      <p:ext uri="{BB962C8B-B14F-4D97-AF65-F5344CB8AC3E}">
+        <p14:creationId xmlns:p14="http://schemas.microsoft.com/office/powerpoint/2010/main" val="3673532248"/>
+      </p:ext>
+    </p:extLst>
+  </p:cSld>
+  <p:clrMapOvr>
+    <a:masterClrMapping/>
+  </p:clrMapOvr>
+  <p:timing>
+    <p:tnLst>
+      <p:par>
+        <p:cTn id="1" dur="indefinite" restart="never" nodeType="tmRoot"/>
+      </p:par>
+    </p:tnLst>
+  </p:timing>
+</p:sld>
+</file>
+
+<file path=ppt/slides/slide12.xml><?xml version="1.0" encoding="utf-8"?>
+<p:sld xmlns:a="http://schemas.openxmlformats.org/drawingml/2006/main" xmlns:r="http://schemas.openxmlformats.org/officeDocument/2006/relationships" xmlns:p="http://schemas.openxmlformats.org/presentationml/2006/main">
+  <p:cSld>
+    <p:spTree>
+      <p:nvGrpSpPr>
+        <p:cNvPr id="1" name=""/>
+        <p:cNvGrpSpPr/>
+        <p:nvPr/>
+      </p:nvGrpSpPr>
+      <p:grpSpPr>
+        <a:xfrm>
+          <a:off x="0" y="0"/>
+          <a:ext cx="0" cy="0"/>
+          <a:chOff x="0" y="0"/>
+          <a:chExt cx="0" cy="0"/>
+        </a:xfrm>
+      </p:grpSpPr>
+      <p:sp>
+        <p:nvSpPr>
+          <p:cNvPr id="2" name="Title 1"/>
+          <p:cNvSpPr>
+            <a:spLocks noGrp="1"/>
+          </p:cNvSpPr>
+          <p:nvPr>
+            <p:ph type="title"/>
+          </p:nvPr>
+        </p:nvSpPr>
+        <p:spPr/>
+        <p:txBody>
+          <a:bodyPr>
+            <a:normAutofit/>
+          </a:bodyPr>
+          <a:lstStyle/>
+          <a:p>
+            <a:r>
+              <a:rPr lang="bg-BG" dirty="0"/>
+              <a:t>Реализация на проекта</a:t>
+            </a:r>
+          </a:p>
+        </p:txBody>
+      </p:sp>
+      <p:sp>
+        <p:nvSpPr>
+          <p:cNvPr id="3" name="Content Placeholder 2"/>
+          <p:cNvSpPr>
+            <a:spLocks noGrp="1"/>
+          </p:cNvSpPr>
+          <p:nvPr>
+            <p:ph idx="1"/>
+          </p:nvPr>
+        </p:nvSpPr>
+        <p:spPr/>
+        <p:txBody>
+          <a:bodyPr/>
+          <a:lstStyle/>
+          <a:p>
+            <a:r>
+              <a:rPr lang="bg-BG" dirty="0"/>
+              <a:t>Р</a:t>
+            </a:r>
+            <a:r>
+              <a:rPr lang="bg-BG" dirty="0" smtClean="0"/>
+              <a:t>азширение за средата </a:t>
+            </a:r>
+            <a:r>
+              <a:rPr lang="en-US" dirty="0" smtClean="0"/>
+              <a:t>Eclipse</a:t>
+            </a:r>
+            <a:r>
+              <a:rPr lang="bg-BG" dirty="0" smtClean="0"/>
+              <a:t>:</a:t>
+            </a:r>
+            <a:endParaRPr lang="en-US" dirty="0" smtClean="0"/>
+          </a:p>
+          <a:p>
+            <a:endParaRPr lang="en-US" dirty="0"/>
+          </a:p>
+          <a:p>
+            <a:endParaRPr lang="bg-BG" dirty="0"/>
+          </a:p>
+        </p:txBody>
+      </p:sp>
+      <p:pic>
+        <p:nvPicPr>
+          <p:cNvPr id="14338" name="Picture 2"/>
+          <p:cNvPicPr>
+            <a:picLocks noChangeAspect="1" noChangeArrowheads="1"/>
+          </p:cNvPicPr>
+          <p:nvPr/>
+        </p:nvPicPr>
+        <p:blipFill>
+          <a:blip r:embed="rId2">
+            <a:extLst>
+              <a:ext uri="{28A0092B-C50C-407E-A947-70E740481C1C}">
+                <a14:useLocalDpi xmlns:a14="http://schemas.microsoft.com/office/drawing/2010/main" val="0"/>
+              </a:ext>
+            </a:extLst>
+          </a:blip>
+          <a:srcRect/>
+          <a:stretch>
+            <a:fillRect/>
+          </a:stretch>
+        </p:blipFill>
+        <p:spPr bwMode="auto">
+          <a:xfrm>
+            <a:off x="2590800" y="2819400"/>
+            <a:ext cx="2924175" cy="2190750"/>
+          </a:xfrm>
+          <a:prstGeom prst="rect">
+            <a:avLst/>
+          </a:prstGeom>
+          <a:noFill/>
+          <a:ln>
+            <a:noFill/>
+          </a:ln>
+          <a:extLst>
+            <a:ext uri="{909E8E84-426E-40DD-AFC4-6F175D3DCCD1}">
+              <a14:hiddenFill xmlns:a14="http://schemas.microsoft.com/office/drawing/2010/main">
+                <a:solidFill>
+                  <a:schemeClr val="accent1"/>
+                </a:solidFill>
+              </a14:hiddenFill>
+            </a:ext>
+            <a:ext uri="{91240B29-F687-4F45-9708-019B960494DF}">
+              <a14:hiddenLine xmlns:a14="http://schemas.microsoft.com/office/drawing/2010/main" w="9525">
+                <a:solidFill>
+                  <a:schemeClr val="tx1"/>
+                </a:solidFill>
+                <a:miter lim="800000"/>
+                <a:headEnd/>
+                <a:tailEnd/>
+              </a14:hiddenLine>
+            </a:ext>
+          </a:extLst>
+        </p:spPr>
+      </p:pic>
+    </p:spTree>
+    <p:extLst>
+      <p:ext uri="{BB962C8B-B14F-4D97-AF65-F5344CB8AC3E}">
+        <p14:creationId xmlns:p14="http://schemas.microsoft.com/office/powerpoint/2010/main" val="181672707"/>
+      </p:ext>
+    </p:extLst>
+  </p:cSld>
+  <p:clrMapOvr>
+    <a:masterClrMapping/>
+  </p:clrMapOvr>
+  <p:timing>
+    <p:tnLst>
+      <p:par>
+        <p:cTn id="1" dur="indefinite" restart="never" nodeType="tmRoot"/>
+      </p:par>
+    </p:tnLst>
+  </p:timing>
+</p:sld>
+</file>
+
+<file path=ppt/slides/slide13.xml><?xml version="1.0" encoding="utf-8"?>
+<p:sld xmlns:a="http://schemas.openxmlformats.org/drawingml/2006/main" xmlns:r="http://schemas.openxmlformats.org/officeDocument/2006/relationships" xmlns:p="http://schemas.openxmlformats.org/presentationml/2006/main">
+  <p:cSld>
+    <p:spTree>
+      <p:nvGrpSpPr>
+        <p:cNvPr id="1" name=""/>
+        <p:cNvGrpSpPr/>
+        <p:nvPr/>
+      </p:nvGrpSpPr>
+      <p:grpSpPr>
+        <a:xfrm>
+          <a:off x="0" y="0"/>
+          <a:ext cx="0" cy="0"/>
+          <a:chOff x="0" y="0"/>
+          <a:chExt cx="0" cy="0"/>
+        </a:xfrm>
+      </p:grpSpPr>
+      <p:sp>
+        <p:nvSpPr>
+          <p:cNvPr id="2" name="Title 1"/>
+          <p:cNvSpPr>
+            <a:spLocks noGrp="1"/>
+          </p:cNvSpPr>
+          <p:nvPr>
+            <p:ph type="title"/>
+          </p:nvPr>
+        </p:nvSpPr>
+        <p:spPr/>
+        <p:txBody>
+          <a:bodyPr>
+            <a:normAutofit/>
+          </a:bodyPr>
+          <a:lstStyle/>
+          <a:p>
+            <a:r>
+              <a:rPr lang="bg-BG" dirty="0" smtClean="0"/>
+              <a:t>Бъдеща работа</a:t>
+            </a:r>
+            <a:endParaRPr lang="bg-BG" dirty="0"/>
+          </a:p>
+        </p:txBody>
+      </p:sp>
+      <p:sp>
+        <p:nvSpPr>
+          <p:cNvPr id="3" name="Content Placeholder 2"/>
+          <p:cNvSpPr>
+            <a:spLocks noGrp="1"/>
+          </p:cNvSpPr>
+          <p:nvPr>
+            <p:ph idx="1"/>
+          </p:nvPr>
+        </p:nvSpPr>
+        <p:spPr/>
+        <p:txBody>
+          <a:bodyPr/>
+          <a:lstStyle/>
+          <a:p>
+            <a:r>
+              <a:rPr lang="bg-BG" dirty="0" smtClean="0"/>
+              <a:t>Подобрения по отношения на сигурността и тестването на системата</a:t>
+            </a:r>
+            <a:endParaRPr lang="en-US" dirty="0" smtClean="0"/>
+          </a:p>
+          <a:p>
+            <a:r>
+              <a:rPr lang="bg-BG" dirty="0" smtClean="0"/>
+              <a:t>Поддръжка на повече състезателни системи</a:t>
+            </a:r>
+            <a:endParaRPr lang="bg-BG" dirty="0"/>
+          </a:p>
+          <a:p>
+            <a:r>
+              <a:rPr lang="bg-BG" dirty="0"/>
+              <a:t>Комуникация между потребителите на </a:t>
+            </a:r>
+            <a:r>
+              <a:rPr lang="bg-BG" dirty="0" smtClean="0"/>
+              <a:t>системата</a:t>
+            </a:r>
+          </a:p>
+          <a:p>
+            <a:r>
+              <a:rPr lang="bg-BG" dirty="0" smtClean="0"/>
+              <a:t>Нови функционалности към отделните компоненти от системата</a:t>
+            </a:r>
+            <a:endParaRPr lang="en-US" dirty="0"/>
+          </a:p>
+          <a:p>
+            <a:endParaRPr lang="bg-BG" dirty="0"/>
+          </a:p>
+        </p:txBody>
+      </p:sp>
+    </p:spTree>
+    <p:extLst>
+      <p:ext uri="{BB962C8B-B14F-4D97-AF65-F5344CB8AC3E}">
+        <p14:creationId xmlns:p14="http://schemas.microsoft.com/office/powerpoint/2010/main" val="1860623676"/>
+      </p:ext>
+    </p:extLst>
+  </p:cSld>
+  <p:clrMapOvr>
+    <a:masterClrMapping/>
+  </p:clrMapOvr>
+  <p:timing>
+    <p:tnLst>
+      <p:par>
+        <p:cTn id="1" dur="indefinite" restart="never" nodeType="tmRoot"/>
+      </p:par>
+    </p:tnLst>
+  </p:timing>
+</p:sld>
+</file>
+
+<file path=ppt/slides/slide14.xml><?xml version="1.0" encoding="utf-8"?>
+<p:sld xmlns:a="http://schemas.openxmlformats.org/drawingml/2006/main" xmlns:r="http://schemas.openxmlformats.org/officeDocument/2006/relationships" xmlns:p="http://schemas.openxmlformats.org/presentationml/2006/main">
+  <p:cSld>
+    <p:spTree>
+      <p:nvGrpSpPr>
+        <p:cNvPr id="1" name=""/>
+        <p:cNvGrpSpPr/>
+        <p:nvPr/>
+      </p:nvGrpSpPr>
+      <p:grpSpPr>
+        <a:xfrm>
+          <a:off x="0" y="0"/>
+          <a:ext cx="0" cy="0"/>
+          <a:chOff x="0" y="0"/>
+          <a:chExt cx="0" cy="0"/>
+        </a:xfrm>
+      </p:grpSpPr>
+      <p:sp>
+        <p:nvSpPr>
+          <p:cNvPr id="2" name="Title 1"/>
+          <p:cNvSpPr>
+            <a:spLocks noGrp="1"/>
+          </p:cNvSpPr>
+          <p:nvPr>
+            <p:ph type="title"/>
+          </p:nvPr>
+        </p:nvSpPr>
+        <p:spPr/>
+        <p:txBody>
+          <a:bodyPr>
+            <a:normAutofit/>
+          </a:bodyPr>
+          <a:lstStyle/>
+          <a:p>
+            <a:r>
+              <a:rPr lang="bg-BG" dirty="0" smtClean="0"/>
+              <a:t>Какво предстои ?</a:t>
+            </a:r>
+            <a:endParaRPr lang="bg-BG" dirty="0"/>
+          </a:p>
+        </p:txBody>
+      </p:sp>
+      <p:sp>
+        <p:nvSpPr>
+          <p:cNvPr id="3" name="Content Placeholder 2"/>
+          <p:cNvSpPr>
+            <a:spLocks noGrp="1"/>
+          </p:cNvSpPr>
+          <p:nvPr>
+            <p:ph idx="1"/>
+          </p:nvPr>
+        </p:nvSpPr>
+        <p:spPr/>
+        <p:txBody>
+          <a:bodyPr/>
+          <a:lstStyle/>
+          <a:p>
+            <a:r>
+              <a:rPr lang="bg-BG" dirty="0" smtClean="0"/>
+              <a:t>Инсталация на системата на</a:t>
+            </a:r>
+            <a:r>
+              <a:rPr lang="en-US" dirty="0" smtClean="0"/>
+              <a:t> </a:t>
+            </a:r>
+            <a:r>
+              <a:rPr lang="en-US" b="1" dirty="0" smtClean="0"/>
+              <a:t>judge.openfmi.net</a:t>
+            </a:r>
+            <a:r>
+              <a:rPr lang="en-US" dirty="0" smtClean="0"/>
+              <a:t> </a:t>
+            </a:r>
+            <a:r>
+              <a:rPr lang="bg-BG" dirty="0" smtClean="0"/>
+              <a:t>сървъра</a:t>
+            </a:r>
+          </a:p>
+          <a:p>
+            <a:endParaRPr lang="bg-BG" dirty="0"/>
+          </a:p>
+          <a:p>
+            <a:r>
+              <a:rPr lang="bg-BG" dirty="0" smtClean="0"/>
+              <a:t>Информационен портал за системата (ориентиран към разработчици, асистенти и студенти)</a:t>
+            </a:r>
+          </a:p>
+          <a:p>
+            <a:endParaRPr lang="bg-BG" dirty="0"/>
+          </a:p>
+        </p:txBody>
+      </p:sp>
+    </p:spTree>
+    <p:extLst>
+      <p:ext uri="{BB962C8B-B14F-4D97-AF65-F5344CB8AC3E}">
+        <p14:creationId xmlns:p14="http://schemas.microsoft.com/office/powerpoint/2010/main" val="2042568588"/>
+      </p:ext>
+    </p:extLst>
+  </p:cSld>
+  <p:clrMapOvr>
+    <a:masterClrMapping/>
+  </p:clrMapOvr>
+  <p:timing>
+    <p:tnLst>
+      <p:par>
+        <p:cTn id="1" dur="indefinite" restart="never" nodeType="tmRoot"/>
+      </p:par>
+    </p:tnLst>
+  </p:timing>
+</p:sld>
+</file>
+
+<file path=ppt/slides/slide15.xml><?xml version="1.0" encoding="utf-8"?>
+<p:sld xmlns:a="http://schemas.openxmlformats.org/drawingml/2006/main" xmlns:r="http://schemas.openxmlformats.org/officeDocument/2006/relationships" xmlns:p="http://schemas.openxmlformats.org/presentationml/2006/main">
+  <p:cSld>
+    <p:spTree>
+      <p:nvGrpSpPr>
+        <p:cNvPr id="1" name=""/>
+        <p:cNvGrpSpPr/>
+        <p:nvPr/>
+      </p:nvGrpSpPr>
+      <p:grpSpPr>
+        <a:xfrm>
+          <a:off x="0" y="0"/>
+          <a:ext cx="0" cy="0"/>
+          <a:chOff x="0" y="0"/>
+          <a:chExt cx="0" cy="0"/>
+        </a:xfrm>
+      </p:grpSpPr>
+      <p:sp>
+        <p:nvSpPr>
+          <p:cNvPr id="2" name="Title 1"/>
+          <p:cNvSpPr>
+            <a:spLocks noGrp="1"/>
+          </p:cNvSpPr>
+          <p:nvPr>
+            <p:ph type="title"/>
+          </p:nvPr>
+        </p:nvSpPr>
+        <p:spPr/>
+        <p:txBody>
+          <a:bodyPr>
+            <a:normAutofit/>
+          </a:bodyPr>
+          <a:lstStyle/>
+          <a:p>
+            <a:r>
+              <a:rPr lang="bg-BG" dirty="0"/>
+              <a:t>Благодаря </a:t>
+            </a:r>
+            <a:r>
+              <a:rPr lang="bg-BG" dirty="0" smtClean="0"/>
+              <a:t>за вниманието</a:t>
+            </a:r>
+            <a:endParaRPr lang="bg-BG" dirty="0"/>
+          </a:p>
+        </p:txBody>
+      </p:sp>
+      <p:sp>
+        <p:nvSpPr>
+          <p:cNvPr id="3" name="Content Placeholder 2"/>
+          <p:cNvSpPr>
+            <a:spLocks noGrp="1"/>
+          </p:cNvSpPr>
+          <p:nvPr>
+            <p:ph idx="1"/>
+          </p:nvPr>
+        </p:nvSpPr>
+        <p:spPr/>
+        <p:txBody>
+          <a:bodyPr/>
+          <a:lstStyle/>
+          <a:p>
+            <a:pPr marL="0" indent="0">
+              <a:buNone/>
+            </a:pPr>
+            <a:endParaRPr lang="bg-BG" dirty="0"/>
+          </a:p>
+          <a:p>
+            <a:pPr marL="0" indent="0">
+              <a:buNone/>
+            </a:pPr>
+            <a:endParaRPr lang="bg-BG" dirty="0" smtClean="0"/>
+          </a:p>
+          <a:p>
+            <a:pPr marL="0" indent="0">
+              <a:buNone/>
+            </a:pPr>
+            <a:r>
+              <a:rPr lang="bg-BG" dirty="0" smtClean="0"/>
+              <a:t>		      </a:t>
+            </a:r>
+            <a:r>
+              <a:rPr lang="bg-BG" sz="5400" dirty="0" smtClean="0"/>
+              <a:t>Въпроси ?</a:t>
+            </a:r>
+            <a:endParaRPr lang="bg-BG" sz="5400" dirty="0"/>
+          </a:p>
+        </p:txBody>
+      </p:sp>
+    </p:spTree>
+    <p:extLst>
+      <p:ext uri="{BB962C8B-B14F-4D97-AF65-F5344CB8AC3E}">
+        <p14:creationId xmlns:p14="http://schemas.microsoft.com/office/powerpoint/2010/main" val="2451152956"/>
+      </p:ext>
+    </p:extLst>
+  </p:cSld>
+  <p:clrMapOvr>
+    <a:masterClrMapping/>
+  </p:clrMapOvr>
+  <p:timing>
+    <p:tnLst>
+      <p:par>
+        <p:cTn id="1" dur="indefinite" restart="never" nodeType="tmRoot"/>
+      </p:par>
+    </p:tnLst>
+  </p:timing>
+</p:sld>
+</file>
+
+<file path=ppt/slides/slide16.xml><?xml version="1.0" encoding="utf-8"?>
+<p:sld xmlns:a="http://schemas.openxmlformats.org/drawingml/2006/main" xmlns:r="http://schemas.openxmlformats.org/officeDocument/2006/relationships" xmlns:p="http://schemas.openxmlformats.org/presentationml/2006/main">
+  <p:cSld>
+    <p:spTree>
+      <p:nvGrpSpPr>
+        <p:cNvPr id="1" name=""/>
+        <p:cNvGrpSpPr/>
+        <p:nvPr/>
+      </p:nvGrpSpPr>
+      <p:grpSpPr>
+        <a:xfrm>
+          <a:off x="0" y="0"/>
+          <a:ext cx="0" cy="0"/>
+          <a:chOff x="0" y="0"/>
+          <a:chExt cx="0" cy="0"/>
+        </a:xfrm>
+      </p:grpSpPr>
+      <p:sp>
+        <p:nvSpPr>
+          <p:cNvPr id="2" name="Title 1"/>
+          <p:cNvSpPr>
+            <a:spLocks noGrp="1"/>
+          </p:cNvSpPr>
+          <p:nvPr>
+            <p:ph type="title"/>
+          </p:nvPr>
+        </p:nvSpPr>
+        <p:spPr/>
+        <p:txBody>
+          <a:bodyPr>
+            <a:normAutofit/>
+          </a:bodyPr>
+          <a:lstStyle/>
+          <a:p>
+            <a:r>
+              <a:rPr lang="bg-BG" dirty="0" smtClean="0"/>
+              <a:t>Полезни връзки</a:t>
+            </a:r>
+            <a:endParaRPr lang="bg-BG" dirty="0"/>
+          </a:p>
+        </p:txBody>
+      </p:sp>
+      <p:sp>
+        <p:nvSpPr>
+          <p:cNvPr id="3" name="Content Placeholder 2"/>
+          <p:cNvSpPr>
+            <a:spLocks noGrp="1"/>
+          </p:cNvSpPr>
+          <p:nvPr>
+            <p:ph idx="1"/>
+          </p:nvPr>
+        </p:nvSpPr>
+        <p:spPr/>
+        <p:txBody>
+          <a:bodyPr>
+            <a:normAutofit/>
+          </a:bodyPr>
+          <a:lstStyle/>
+          <a:p>
+            <a:pPr marL="0" indent="0">
+              <a:buNone/>
+            </a:pPr>
+            <a:r>
+              <a:rPr lang="bg-BG" sz="3000" dirty="0" smtClean="0"/>
+              <a:t>Хранилище на системата:</a:t>
+            </a:r>
+          </a:p>
+          <a:p>
+            <a:pPr marL="0" indent="0">
+              <a:buNone/>
+            </a:pPr>
+            <a:r>
+              <a:rPr lang="en-US" sz="2800" dirty="0">
+                <a:hlinkClick r:id="rId2"/>
+              </a:rPr>
+              <a:t>https://</a:t>
+            </a:r>
+            <a:r>
+              <a:rPr lang="en-US" sz="2800" dirty="0" smtClean="0">
+                <a:hlinkClick r:id="rId2"/>
+              </a:rPr>
+              <a:t>github.com/martinfmi/grading_ecosystem</a:t>
+            </a:r>
+            <a:endParaRPr lang="bg-BG" sz="2800" dirty="0" smtClean="0"/>
+          </a:p>
+          <a:p>
+            <a:pPr marL="0" indent="0">
+              <a:buNone/>
+            </a:pPr>
+            <a:endParaRPr lang="bg-BG" sz="3000" dirty="0"/>
+          </a:p>
+        </p:txBody>
+      </p:sp>
+    </p:spTree>
+    <p:extLst>
+      <p:ext uri="{BB962C8B-B14F-4D97-AF65-F5344CB8AC3E}">
+        <p14:creationId xmlns:p14="http://schemas.microsoft.com/office/powerpoint/2010/main" val="3445393098"/>
+      </p:ext>
+    </p:extLst>
+  </p:cSld>
+  <p:clrMapOvr>
+    <a:masterClrMapping/>
+  </p:clrMapOvr>
+  <p:timing>
+    <p:tnLst>
+      <p:par>
+        <p:cTn id="1" dur="indefinite" restart="never" nodeType="tmRoot"/>
+      </p:par>
+    </p:tnLst>
+  </p:timing>
 </p:sld>
 </file>
 
@@ -3146,8 +4226,8 @@
           <a:lstStyle/>
           <a:p>
             <a:r>
-              <a:rPr lang="en-US" smtClean="0"/>
-              <a:t>Agenda</a:t>
+              <a:rPr lang="bg-BG" dirty="0" smtClean="0"/>
+              <a:t>Теми</a:t>
             </a:r>
             <a:endParaRPr lang="bg-BG" dirty="0"/>
           </a:p>
@@ -3168,20 +4248,34 @@
           <a:bodyPr/>
           <a:lstStyle/>
           <a:p>
-            <a:r>
-              <a:rPr lang="en-US" dirty="0" smtClean="0"/>
-              <a:t>Grading Ecosystem overview</a:t>
-            </a:r>
-          </a:p>
-          <a:p>
-            <a:r>
-              <a:rPr lang="en-US" smtClean="0"/>
-              <a:t>(overview of modules </a:t>
-            </a:r>
-            <a:r>
-              <a:rPr lang="en-US" dirty="0" smtClean="0"/>
-              <a:t>to overview)</a:t>
-            </a:r>
+            <a:endParaRPr lang="bg-BG" dirty="0" smtClean="0"/>
+          </a:p>
+          <a:p>
+            <a:r>
+              <a:rPr lang="bg-BG" sz="3000" dirty="0" smtClean="0"/>
+              <a:t>Проблемна област</a:t>
+            </a:r>
+          </a:p>
+          <a:p>
+            <a:endParaRPr lang="bg-BG" sz="3000" dirty="0" smtClean="0"/>
+          </a:p>
+          <a:p>
+            <a:r>
+              <a:rPr lang="bg-BG" sz="3000" dirty="0" smtClean="0"/>
+              <a:t>Реализация на проекта</a:t>
+            </a:r>
+            <a:endParaRPr lang="bg-BG" sz="3000" dirty="0"/>
+          </a:p>
+          <a:p>
+            <a:endParaRPr lang="bg-BG" sz="3000" dirty="0" smtClean="0"/>
+          </a:p>
+          <a:p>
+            <a:r>
+              <a:rPr lang="bg-BG" sz="3000" dirty="0" smtClean="0"/>
+              <a:t>Бъдеща работа</a:t>
+            </a:r>
+          </a:p>
+          <a:p>
             <a:endParaRPr lang="bg-BG" dirty="0"/>
           </a:p>
         </p:txBody>
@@ -3189,13 +4283,1048 @@
     </p:spTree>
     <p:extLst>
       <p:ext uri="{BB962C8B-B14F-4D97-AF65-F5344CB8AC3E}">
-        <p14:creationId xmlns:p14="http://schemas.microsoft.com/office/powerpoint/2010/main" val="1816903767"/>
+        <p14:creationId xmlns:p14="http://schemas.microsoft.com/office/powerpoint/2010/main" val="1657086841"/>
       </p:ext>
     </p:extLst>
   </p:cSld>
   <p:clrMapOvr>
     <a:masterClrMapping/>
   </p:clrMapOvr>
+  <p:timing>
+    <p:tnLst>
+      <p:par>
+        <p:cTn id="1" dur="indefinite" restart="never" nodeType="tmRoot"/>
+      </p:par>
+    </p:tnLst>
+  </p:timing>
+</p:sld>
+</file>
+
+<file path=ppt/slides/slide3.xml><?xml version="1.0" encoding="utf-8"?>
+<p:sld xmlns:a="http://schemas.openxmlformats.org/drawingml/2006/main" xmlns:r="http://schemas.openxmlformats.org/officeDocument/2006/relationships" xmlns:p="http://schemas.openxmlformats.org/presentationml/2006/main">
+  <p:cSld>
+    <p:spTree>
+      <p:nvGrpSpPr>
+        <p:cNvPr id="1" name=""/>
+        <p:cNvGrpSpPr/>
+        <p:nvPr/>
+      </p:nvGrpSpPr>
+      <p:grpSpPr>
+        <a:xfrm>
+          <a:off x="0" y="0"/>
+          <a:ext cx="0" cy="0"/>
+          <a:chOff x="0" y="0"/>
+          <a:chExt cx="0" cy="0"/>
+        </a:xfrm>
+      </p:grpSpPr>
+      <p:sp>
+        <p:nvSpPr>
+          <p:cNvPr id="2" name="Title 1"/>
+          <p:cNvSpPr>
+            <a:spLocks noGrp="1"/>
+          </p:cNvSpPr>
+          <p:nvPr>
+            <p:ph type="title"/>
+          </p:nvPr>
+        </p:nvSpPr>
+        <p:spPr/>
+        <p:txBody>
+          <a:bodyPr>
+            <a:normAutofit/>
+          </a:bodyPr>
+          <a:lstStyle/>
+          <a:p>
+            <a:r>
+              <a:rPr lang="bg-BG" dirty="0" smtClean="0"/>
+              <a:t>Проблемна област</a:t>
+            </a:r>
+            <a:endParaRPr lang="bg-BG" dirty="0"/>
+          </a:p>
+        </p:txBody>
+      </p:sp>
+      <p:sp>
+        <p:nvSpPr>
+          <p:cNvPr id="3" name="Content Placeholder 2"/>
+          <p:cNvSpPr>
+            <a:spLocks noGrp="1"/>
+          </p:cNvSpPr>
+          <p:nvPr>
+            <p:ph idx="1"/>
+          </p:nvPr>
+        </p:nvSpPr>
+        <p:spPr/>
+        <p:txBody>
+          <a:bodyPr>
+            <a:normAutofit/>
+          </a:bodyPr>
+          <a:lstStyle/>
+          <a:p>
+            <a:r>
+              <a:rPr lang="bg-BG" sz="3000" dirty="0" smtClean="0"/>
+              <a:t>Липса на средства за лесно администриране на съществуващите системи (</a:t>
+            </a:r>
+            <a:r>
+              <a:rPr lang="en-US" sz="3000" dirty="0" smtClean="0"/>
+              <a:t>spoj0 </a:t>
+            </a:r>
+            <a:r>
+              <a:rPr lang="bg-BG" sz="3000" dirty="0" smtClean="0"/>
+              <a:t>и </a:t>
+            </a:r>
+            <a:r>
+              <a:rPr lang="en-US" sz="3000" dirty="0" err="1" smtClean="0"/>
+              <a:t>maycamp</a:t>
+            </a:r>
+            <a:r>
+              <a:rPr lang="en-US" sz="3000" dirty="0" smtClean="0"/>
+              <a:t>)</a:t>
+            </a:r>
+          </a:p>
+          <a:p>
+            <a:endParaRPr lang="en-US" sz="3000" dirty="0"/>
+          </a:p>
+          <a:p>
+            <a:r>
+              <a:rPr lang="bg-BG" sz="3000" dirty="0" smtClean="0"/>
+              <a:t>Липса на общ формат за представяне на задачите и съответно - на тяхната преизползваемост</a:t>
+            </a:r>
+            <a:endParaRPr lang="bg-BG" sz="3000" dirty="0"/>
+          </a:p>
+        </p:txBody>
+      </p:sp>
+    </p:spTree>
+    <p:extLst>
+      <p:ext uri="{BB962C8B-B14F-4D97-AF65-F5344CB8AC3E}">
+        <p14:creationId xmlns:p14="http://schemas.microsoft.com/office/powerpoint/2010/main" val="1788644199"/>
+      </p:ext>
+    </p:extLst>
+  </p:cSld>
+  <p:clrMapOvr>
+    <a:masterClrMapping/>
+  </p:clrMapOvr>
+  <p:timing>
+    <p:tnLst>
+      <p:par>
+        <p:cTn id="1" dur="indefinite" restart="never" nodeType="tmRoot"/>
+      </p:par>
+    </p:tnLst>
+  </p:timing>
+</p:sld>
+</file>
+
+<file path=ppt/slides/slide4.xml><?xml version="1.0" encoding="utf-8"?>
+<p:sld xmlns:a="http://schemas.openxmlformats.org/drawingml/2006/main" xmlns:r="http://schemas.openxmlformats.org/officeDocument/2006/relationships" xmlns:p="http://schemas.openxmlformats.org/presentationml/2006/main">
+  <p:cSld>
+    <p:spTree>
+      <p:nvGrpSpPr>
+        <p:cNvPr id="1" name=""/>
+        <p:cNvGrpSpPr/>
+        <p:nvPr/>
+      </p:nvGrpSpPr>
+      <p:grpSpPr>
+        <a:xfrm>
+          <a:off x="0" y="0"/>
+          <a:ext cx="0" cy="0"/>
+          <a:chOff x="0" y="0"/>
+          <a:chExt cx="0" cy="0"/>
+        </a:xfrm>
+      </p:grpSpPr>
+      <p:sp>
+        <p:nvSpPr>
+          <p:cNvPr id="2" name="Title 1"/>
+          <p:cNvSpPr>
+            <a:spLocks noGrp="1"/>
+          </p:cNvSpPr>
+          <p:nvPr>
+            <p:ph type="title"/>
+          </p:nvPr>
+        </p:nvSpPr>
+        <p:spPr/>
+        <p:txBody>
+          <a:bodyPr>
+            <a:normAutofit/>
+          </a:bodyPr>
+          <a:lstStyle/>
+          <a:p>
+            <a:r>
+              <a:rPr lang="bg-BG" dirty="0" smtClean="0"/>
+              <a:t>Проблемна област</a:t>
+            </a:r>
+            <a:endParaRPr lang="bg-BG" dirty="0"/>
+          </a:p>
+        </p:txBody>
+      </p:sp>
+      <p:sp>
+        <p:nvSpPr>
+          <p:cNvPr id="3" name="Content Placeholder 2"/>
+          <p:cNvSpPr>
+            <a:spLocks noGrp="1"/>
+          </p:cNvSpPr>
+          <p:nvPr>
+            <p:ph idx="1"/>
+          </p:nvPr>
+        </p:nvSpPr>
+        <p:spPr/>
+        <p:txBody>
+          <a:bodyPr>
+            <a:normAutofit/>
+          </a:bodyPr>
+          <a:lstStyle/>
+          <a:p>
+            <a:r>
+              <a:rPr lang="bg-BG" sz="3000" dirty="0" smtClean="0"/>
+              <a:t>Трудно презиползване на задачи от други системи (основно поради липса на достъп до тестовете на задачите)</a:t>
+            </a:r>
+          </a:p>
+          <a:p>
+            <a:endParaRPr lang="bg-BG" sz="3000" dirty="0"/>
+          </a:p>
+          <a:p>
+            <a:r>
+              <a:rPr lang="bg-BG" sz="3000" dirty="0" smtClean="0"/>
+              <a:t>Липса на категоризация на задачите</a:t>
+            </a:r>
+            <a:endParaRPr lang="en-US" sz="3000" dirty="0" smtClean="0"/>
+          </a:p>
+          <a:p>
+            <a:endParaRPr lang="en-US" sz="3000" dirty="0"/>
+          </a:p>
+          <a:p>
+            <a:r>
+              <a:rPr lang="bg-BG" sz="3000" dirty="0" smtClean="0"/>
+              <a:t>Липса на интеграция със среди за разработка</a:t>
+            </a:r>
+            <a:endParaRPr lang="bg-BG" sz="3000" dirty="0"/>
+          </a:p>
+        </p:txBody>
+      </p:sp>
+    </p:spTree>
+    <p:extLst>
+      <p:ext uri="{BB962C8B-B14F-4D97-AF65-F5344CB8AC3E}">
+        <p14:creationId xmlns:p14="http://schemas.microsoft.com/office/powerpoint/2010/main" val="814248976"/>
+      </p:ext>
+    </p:extLst>
+  </p:cSld>
+  <p:clrMapOvr>
+    <a:masterClrMapping/>
+  </p:clrMapOvr>
+  <p:timing>
+    <p:tnLst>
+      <p:par>
+        <p:cTn id="1" dur="indefinite" restart="never" nodeType="tmRoot"/>
+      </p:par>
+    </p:tnLst>
+  </p:timing>
+</p:sld>
+</file>
+
+<file path=ppt/slides/slide5.xml><?xml version="1.0" encoding="utf-8"?>
+<p:sld xmlns:a="http://schemas.openxmlformats.org/drawingml/2006/main" xmlns:r="http://schemas.openxmlformats.org/officeDocument/2006/relationships" xmlns:p="http://schemas.openxmlformats.org/presentationml/2006/main">
+  <p:cSld>
+    <p:spTree>
+      <p:nvGrpSpPr>
+        <p:cNvPr id="1" name=""/>
+        <p:cNvGrpSpPr/>
+        <p:nvPr/>
+      </p:nvGrpSpPr>
+      <p:grpSpPr>
+        <a:xfrm>
+          <a:off x="0" y="0"/>
+          <a:ext cx="0" cy="0"/>
+          <a:chOff x="0" y="0"/>
+          <a:chExt cx="0" cy="0"/>
+        </a:xfrm>
+      </p:grpSpPr>
+      <p:sp>
+        <p:nvSpPr>
+          <p:cNvPr id="2" name="Title 1"/>
+          <p:cNvSpPr>
+            <a:spLocks noGrp="1"/>
+          </p:cNvSpPr>
+          <p:nvPr>
+            <p:ph type="title"/>
+          </p:nvPr>
+        </p:nvSpPr>
+        <p:spPr/>
+        <p:txBody>
+          <a:bodyPr>
+            <a:normAutofit/>
+          </a:bodyPr>
+          <a:lstStyle/>
+          <a:p>
+            <a:r>
+              <a:rPr lang="bg-BG" dirty="0" smtClean="0"/>
+              <a:t>Реализация на проекта</a:t>
+            </a:r>
+            <a:endParaRPr lang="bg-BG" dirty="0"/>
+          </a:p>
+        </p:txBody>
+      </p:sp>
+      <p:sp>
+        <p:nvSpPr>
+          <p:cNvPr id="3" name="Content Placeholder 2"/>
+          <p:cNvSpPr>
+            <a:spLocks noGrp="1"/>
+          </p:cNvSpPr>
+          <p:nvPr>
+            <p:ph idx="1"/>
+          </p:nvPr>
+        </p:nvSpPr>
+        <p:spPr/>
+        <p:txBody>
+          <a:bodyPr/>
+          <a:lstStyle/>
+          <a:p>
+            <a:r>
+              <a:rPr lang="bg-BG" sz="3000" dirty="0" smtClean="0"/>
+              <a:t>Подход за справяне с посочените проблеми е реализацията на разпределена система, която предоставя:</a:t>
+            </a:r>
+          </a:p>
+          <a:p>
+            <a:pPr lvl="1"/>
+            <a:r>
+              <a:rPr lang="bg-BG" sz="2600" dirty="0" smtClean="0"/>
+              <a:t>централно хранилище за задачите и статиите</a:t>
+            </a:r>
+          </a:p>
+          <a:p>
+            <a:pPr lvl="1"/>
+            <a:r>
+              <a:rPr lang="bg-BG" sz="2600" dirty="0"/>
+              <a:t>п</a:t>
+            </a:r>
+            <a:r>
+              <a:rPr lang="bg-BG" sz="2600" dirty="0" smtClean="0"/>
+              <a:t>риложен сървър за интеграция на състезателни системи</a:t>
+            </a:r>
+          </a:p>
+          <a:p>
+            <a:pPr lvl="1"/>
+            <a:r>
+              <a:rPr lang="bg-BG" sz="2600" dirty="0" smtClean="0"/>
+              <a:t>разширения на системите </a:t>
+            </a:r>
+            <a:r>
+              <a:rPr lang="en-US" sz="2600" dirty="0" smtClean="0"/>
+              <a:t>spoj0 </a:t>
+            </a:r>
+            <a:r>
+              <a:rPr lang="bg-BG" sz="2600" dirty="0" smtClean="0"/>
+              <a:t>и </a:t>
+            </a:r>
+            <a:r>
+              <a:rPr lang="en-US" sz="2600" dirty="0" err="1" smtClean="0"/>
+              <a:t>maycamp</a:t>
+            </a:r>
+            <a:r>
+              <a:rPr lang="en-US" sz="2600" dirty="0" smtClean="0"/>
+              <a:t> </a:t>
+            </a:r>
+            <a:endParaRPr lang="bg-BG" sz="2600" dirty="0"/>
+          </a:p>
+          <a:p>
+            <a:pPr lvl="1"/>
+            <a:r>
+              <a:rPr lang="bg-BG" sz="2600" dirty="0"/>
+              <a:t>к</a:t>
+            </a:r>
+            <a:r>
+              <a:rPr lang="bg-BG" sz="2600" dirty="0" smtClean="0"/>
+              <a:t>лиенти за работа със системата (административен интерфейс и разширение за</a:t>
+            </a:r>
+            <a:r>
+              <a:rPr lang="en-US" sz="2600" dirty="0" smtClean="0"/>
+              <a:t> </a:t>
+            </a:r>
+            <a:r>
+              <a:rPr lang="bg-BG" sz="2600" dirty="0" smtClean="0"/>
+              <a:t>средата Еклипс)</a:t>
+            </a:r>
+          </a:p>
+          <a:p>
+            <a:pPr lvl="1"/>
+            <a:endParaRPr lang="bg-BG" dirty="0"/>
+          </a:p>
+        </p:txBody>
+      </p:sp>
+    </p:spTree>
+    <p:extLst>
+      <p:ext uri="{BB962C8B-B14F-4D97-AF65-F5344CB8AC3E}">
+        <p14:creationId xmlns:p14="http://schemas.microsoft.com/office/powerpoint/2010/main" val="1788644199"/>
+      </p:ext>
+    </p:extLst>
+  </p:cSld>
+  <p:clrMapOvr>
+    <a:masterClrMapping/>
+  </p:clrMapOvr>
+  <p:timing>
+    <p:tnLst>
+      <p:par>
+        <p:cTn id="1" dur="indefinite" restart="never" nodeType="tmRoot"/>
+      </p:par>
+    </p:tnLst>
+  </p:timing>
+</p:sld>
+</file>
+
+<file path=ppt/slides/slide6.xml><?xml version="1.0" encoding="utf-8"?>
+<p:sld xmlns:a="http://schemas.openxmlformats.org/drawingml/2006/main" xmlns:r="http://schemas.openxmlformats.org/officeDocument/2006/relationships" xmlns:p="http://schemas.openxmlformats.org/presentationml/2006/main">
+  <p:cSld>
+    <p:spTree>
+      <p:nvGrpSpPr>
+        <p:cNvPr id="1" name=""/>
+        <p:cNvGrpSpPr/>
+        <p:nvPr/>
+      </p:nvGrpSpPr>
+      <p:grpSpPr>
+        <a:xfrm>
+          <a:off x="0" y="0"/>
+          <a:ext cx="0" cy="0"/>
+          <a:chOff x="0" y="0"/>
+          <a:chExt cx="0" cy="0"/>
+        </a:xfrm>
+      </p:grpSpPr>
+      <p:sp>
+        <p:nvSpPr>
+          <p:cNvPr id="2" name="Title 1"/>
+          <p:cNvSpPr>
+            <a:spLocks noGrp="1"/>
+          </p:cNvSpPr>
+          <p:nvPr>
+            <p:ph type="title"/>
+          </p:nvPr>
+        </p:nvSpPr>
+        <p:spPr/>
+        <p:txBody>
+          <a:bodyPr>
+            <a:normAutofit/>
+          </a:bodyPr>
+          <a:lstStyle/>
+          <a:p>
+            <a:r>
+              <a:rPr lang="bg-BG" dirty="0"/>
+              <a:t>Реализация на проекта</a:t>
+            </a:r>
+          </a:p>
+        </p:txBody>
+      </p:sp>
+      <p:sp>
+        <p:nvSpPr>
+          <p:cNvPr id="3" name="Content Placeholder 2"/>
+          <p:cNvSpPr>
+            <a:spLocks noGrp="1"/>
+          </p:cNvSpPr>
+          <p:nvPr>
+            <p:ph idx="1"/>
+          </p:nvPr>
+        </p:nvSpPr>
+        <p:spPr/>
+        <p:txBody>
+          <a:bodyPr/>
+          <a:lstStyle/>
+          <a:p>
+            <a:r>
+              <a:rPr lang="bg-BG" dirty="0" smtClean="0"/>
+              <a:t>Архитектура:</a:t>
+            </a:r>
+            <a:endParaRPr lang="en-US" dirty="0" smtClean="0"/>
+          </a:p>
+          <a:p>
+            <a:endParaRPr lang="en-US" dirty="0"/>
+          </a:p>
+          <a:p>
+            <a:endParaRPr lang="bg-BG" dirty="0"/>
+          </a:p>
+        </p:txBody>
+      </p:sp>
+      <p:pic>
+        <p:nvPicPr>
+          <p:cNvPr id="2050" name="Picture 2"/>
+          <p:cNvPicPr>
+            <a:picLocks noChangeAspect="1" noChangeArrowheads="1"/>
+          </p:cNvPicPr>
+          <p:nvPr/>
+        </p:nvPicPr>
+        <p:blipFill>
+          <a:blip r:embed="rId2">
+            <a:extLst>
+              <a:ext uri="{28A0092B-C50C-407E-A947-70E740481C1C}">
+                <a14:useLocalDpi xmlns:a14="http://schemas.microsoft.com/office/drawing/2010/main" val="0"/>
+              </a:ext>
+            </a:extLst>
+          </a:blip>
+          <a:srcRect/>
+          <a:stretch>
+            <a:fillRect/>
+          </a:stretch>
+        </p:blipFill>
+        <p:spPr bwMode="auto">
+          <a:xfrm>
+            <a:off x="1295400" y="2173914"/>
+            <a:ext cx="6457950" cy="4455485"/>
+          </a:xfrm>
+          <a:prstGeom prst="rect">
+            <a:avLst/>
+          </a:prstGeom>
+          <a:noFill/>
+          <a:ln>
+            <a:noFill/>
+          </a:ln>
+          <a:extLst>
+            <a:ext uri="{909E8E84-426E-40DD-AFC4-6F175D3DCCD1}">
+              <a14:hiddenFill xmlns:a14="http://schemas.microsoft.com/office/drawing/2010/main">
+                <a:solidFill>
+                  <a:schemeClr val="accent1"/>
+                </a:solidFill>
+              </a14:hiddenFill>
+            </a:ext>
+            <a:ext uri="{91240B29-F687-4F45-9708-019B960494DF}">
+              <a14:hiddenLine xmlns:a14="http://schemas.microsoft.com/office/drawing/2010/main" w="9525">
+                <a:solidFill>
+                  <a:schemeClr val="tx1"/>
+                </a:solidFill>
+                <a:miter lim="800000"/>
+                <a:headEnd/>
+                <a:tailEnd/>
+              </a14:hiddenLine>
+            </a:ext>
+          </a:extLst>
+        </p:spPr>
+      </p:pic>
+    </p:spTree>
+    <p:extLst>
+      <p:ext uri="{BB962C8B-B14F-4D97-AF65-F5344CB8AC3E}">
+        <p14:creationId xmlns:p14="http://schemas.microsoft.com/office/powerpoint/2010/main" val="2051728433"/>
+      </p:ext>
+    </p:extLst>
+  </p:cSld>
+  <p:clrMapOvr>
+    <a:masterClrMapping/>
+  </p:clrMapOvr>
+  <p:timing>
+    <p:tnLst>
+      <p:par>
+        <p:cTn id="1" dur="indefinite" restart="never" nodeType="tmRoot"/>
+      </p:par>
+    </p:tnLst>
+  </p:timing>
+</p:sld>
+</file>
+
+<file path=ppt/slides/slide7.xml><?xml version="1.0" encoding="utf-8"?>
+<p:sld xmlns:a="http://schemas.openxmlformats.org/drawingml/2006/main" xmlns:r="http://schemas.openxmlformats.org/officeDocument/2006/relationships" xmlns:p="http://schemas.openxmlformats.org/presentationml/2006/main">
+  <p:cSld>
+    <p:spTree>
+      <p:nvGrpSpPr>
+        <p:cNvPr id="1" name=""/>
+        <p:cNvGrpSpPr/>
+        <p:nvPr/>
+      </p:nvGrpSpPr>
+      <p:grpSpPr>
+        <a:xfrm>
+          <a:off x="0" y="0"/>
+          <a:ext cx="0" cy="0"/>
+          <a:chOff x="0" y="0"/>
+          <a:chExt cx="0" cy="0"/>
+        </a:xfrm>
+      </p:grpSpPr>
+      <p:sp>
+        <p:nvSpPr>
+          <p:cNvPr id="2" name="Title 1"/>
+          <p:cNvSpPr>
+            <a:spLocks noGrp="1"/>
+          </p:cNvSpPr>
+          <p:nvPr>
+            <p:ph type="title"/>
+          </p:nvPr>
+        </p:nvSpPr>
+        <p:spPr/>
+        <p:txBody>
+          <a:bodyPr>
+            <a:normAutofit/>
+          </a:bodyPr>
+          <a:lstStyle/>
+          <a:p>
+            <a:r>
+              <a:rPr lang="bg-BG" dirty="0"/>
+              <a:t>Реализация на проекта</a:t>
+            </a:r>
+          </a:p>
+        </p:txBody>
+      </p:sp>
+      <p:sp>
+        <p:nvSpPr>
+          <p:cNvPr id="3" name="Content Placeholder 2"/>
+          <p:cNvSpPr>
+            <a:spLocks noGrp="1"/>
+          </p:cNvSpPr>
+          <p:nvPr>
+            <p:ph idx="1"/>
+          </p:nvPr>
+        </p:nvSpPr>
+        <p:spPr/>
+        <p:txBody>
+          <a:bodyPr/>
+          <a:lstStyle/>
+          <a:p>
+            <a:r>
+              <a:rPr lang="bg-BG" dirty="0" smtClean="0"/>
+              <a:t>Хранилище:</a:t>
+            </a:r>
+            <a:endParaRPr lang="en-US" dirty="0" smtClean="0"/>
+          </a:p>
+          <a:p>
+            <a:endParaRPr lang="en-US" dirty="0"/>
+          </a:p>
+          <a:p>
+            <a:endParaRPr lang="bg-BG" dirty="0"/>
+          </a:p>
+        </p:txBody>
+      </p:sp>
+      <p:sp>
+        <p:nvSpPr>
+          <p:cNvPr id="4" name="Rectangle 2"/>
+          <p:cNvSpPr>
+            <a:spLocks noChangeArrowheads="1"/>
+          </p:cNvSpPr>
+          <p:nvPr/>
+        </p:nvSpPr>
+        <p:spPr bwMode="auto">
+          <a:xfrm>
+            <a:off x="0" y="0"/>
+            <a:ext cx="9144000" cy="0"/>
+          </a:xfrm>
+          <a:prstGeom prst="rect">
+            <a:avLst/>
+          </a:prstGeom>
+          <a:noFill/>
+          <a:ln>
+            <a:noFill/>
+          </a:ln>
+          <a:effectLst/>
+          <a:extLst>
+            <a:ext uri="{909E8E84-426E-40DD-AFC4-6F175D3DCCD1}">
+              <a14:hiddenFill xmlns:a14="http://schemas.microsoft.com/office/drawing/2010/main">
+                <a:solidFill>
+                  <a:schemeClr val="accent1"/>
+                </a:solidFill>
+              </a14:hiddenFill>
+            </a:ext>
+            <a:ext uri="{91240B29-F687-4F45-9708-019B960494DF}">
+              <a14:hiddenLine xmlns:a14="http://schemas.microsoft.com/office/drawing/2010/main" w="9525">
+                <a:solidFill>
+                  <a:schemeClr val="tx1"/>
+                </a:solidFill>
+                <a:miter lim="800000"/>
+                <a:headEnd/>
+                <a:tailEnd/>
+              </a14:hiddenLine>
+            </a:ext>
+            <a:ext uri="{AF507438-7753-43E0-B8FC-AC1667EBCBE1}">
+              <a14:hiddenEffects xmlns:a14="http://schemas.microsoft.com/office/drawing/2010/main">
+                <a:effectLst>
+                  <a:outerShdw dist="35921" dir="2700000" algn="ctr" rotWithShape="0">
+                    <a:schemeClr val="bg2"/>
+                  </a:outerShdw>
+                </a:effectLst>
+              </a14:hiddenEffects>
+            </a:ext>
+          </a:extLst>
+        </p:spPr>
+        <p:txBody>
+          <a:bodyPr vert="horz" wrap="none" lIns="91440" tIns="45720" rIns="91440" bIns="45720" numCol="1" anchor="ctr" anchorCtr="0" compatLnSpc="1">
+            <a:prstTxWarp prst="textNoShape">
+              <a:avLst/>
+            </a:prstTxWarp>
+            <a:spAutoFit/>
+          </a:bodyPr>
+          <a:lstStyle/>
+          <a:p>
+            <a:endParaRPr lang="bg-BG"/>
+          </a:p>
+        </p:txBody>
+      </p:sp>
+      <p:graphicFrame>
+        <p:nvGraphicFramePr>
+          <p:cNvPr id="6" name="Object 5"/>
+          <p:cNvGraphicFramePr>
+            <a:graphicFrameLocks noChangeAspect="1"/>
+          </p:cNvGraphicFramePr>
+          <p:nvPr>
+            <p:extLst>
+              <p:ext uri="{D42A27DB-BD31-4B8C-83A1-F6EECF244321}">
+                <p14:modId xmlns:p14="http://schemas.microsoft.com/office/powerpoint/2010/main" val="201278346"/>
+              </p:ext>
+            </p:extLst>
+          </p:nvPr>
+        </p:nvGraphicFramePr>
+        <p:xfrm>
+          <a:off x="1524000" y="2667000"/>
+          <a:ext cx="5229225" cy="1590675"/>
+        </p:xfrm>
+        <a:graphic>
+          <a:graphicData uri="http://schemas.openxmlformats.org/presentationml/2006/ole">
+            <mc:AlternateContent xmlns:mc="http://schemas.openxmlformats.org/markup-compatibility/2006">
+              <mc:Choice xmlns:v="urn:schemas-microsoft-com:vml" Requires="v">
+                <p:oleObj spid="_x0000_s11304" name="Visio" r:id="rId3" imgW="5231527" imgH="1588829" progId="Visio.Drawing.11">
+                  <p:embed/>
+                </p:oleObj>
+              </mc:Choice>
+              <mc:Fallback>
+                <p:oleObj name="Visio" r:id="rId3" imgW="5231527" imgH="1588829" progId="Visio.Drawing.11">
+                  <p:embed/>
+                  <p:pic>
+                    <p:nvPicPr>
+                      <p:cNvPr id="0" name="Object 1"/>
+                      <p:cNvPicPr>
+                        <a:picLocks noChangeAspect="1" noChangeArrowheads="1"/>
+                      </p:cNvPicPr>
+                      <p:nvPr/>
+                    </p:nvPicPr>
+                    <p:blipFill>
+                      <a:blip r:embed="rId4">
+                        <a:extLst>
+                          <a:ext uri="{28A0092B-C50C-407E-A947-70E740481C1C}">
+                            <a14:useLocalDpi xmlns:a14="http://schemas.microsoft.com/office/drawing/2010/main" val="0"/>
+                          </a:ext>
+                        </a:extLst>
+                      </a:blip>
+                      <a:srcRect/>
+                      <a:stretch>
+                        <a:fillRect/>
+                      </a:stretch>
+                    </p:blipFill>
+                    <p:spPr bwMode="auto">
+                      <a:xfrm>
+                        <a:off x="1524000" y="2667000"/>
+                        <a:ext cx="5229225" cy="1590675"/>
+                      </a:xfrm>
+                      <a:prstGeom prst="rect">
+                        <a:avLst/>
+                      </a:prstGeom>
+                      <a:noFill/>
+                      <a:extLst>
+                        <a:ext uri="{909E8E84-426E-40DD-AFC4-6F175D3DCCD1}">
+                          <a14:hiddenFill xmlns:a14="http://schemas.microsoft.com/office/drawing/2010/main">
+                            <a:solidFill>
+                              <a:srgbClr val="FFFFFF"/>
+                            </a:solidFill>
+                          </a14:hiddenFill>
+                        </a:ext>
+                      </a:extLst>
+                    </p:spPr>
+                  </p:pic>
+                </p:oleObj>
+              </mc:Fallback>
+            </mc:AlternateContent>
+          </a:graphicData>
+        </a:graphic>
+      </p:graphicFrame>
+    </p:spTree>
+    <p:extLst>
+      <p:ext uri="{BB962C8B-B14F-4D97-AF65-F5344CB8AC3E}">
+        <p14:creationId xmlns:p14="http://schemas.microsoft.com/office/powerpoint/2010/main" val="2390166570"/>
+      </p:ext>
+    </p:extLst>
+  </p:cSld>
+  <p:clrMapOvr>
+    <a:masterClrMapping/>
+  </p:clrMapOvr>
+  <p:timing>
+    <p:tnLst>
+      <p:par>
+        <p:cTn id="1" dur="indefinite" restart="never" nodeType="tmRoot"/>
+      </p:par>
+    </p:tnLst>
+  </p:timing>
+</p:sld>
+</file>
+
+<file path=ppt/slides/slide8.xml><?xml version="1.0" encoding="utf-8"?>
+<p:sld xmlns:a="http://schemas.openxmlformats.org/drawingml/2006/main" xmlns:r="http://schemas.openxmlformats.org/officeDocument/2006/relationships" xmlns:p="http://schemas.openxmlformats.org/presentationml/2006/main">
+  <p:cSld>
+    <p:spTree>
+      <p:nvGrpSpPr>
+        <p:cNvPr id="1" name=""/>
+        <p:cNvGrpSpPr/>
+        <p:nvPr/>
+      </p:nvGrpSpPr>
+      <p:grpSpPr>
+        <a:xfrm>
+          <a:off x="0" y="0"/>
+          <a:ext cx="0" cy="0"/>
+          <a:chOff x="0" y="0"/>
+          <a:chExt cx="0" cy="0"/>
+        </a:xfrm>
+      </p:grpSpPr>
+      <p:sp>
+        <p:nvSpPr>
+          <p:cNvPr id="2" name="Title 1"/>
+          <p:cNvSpPr>
+            <a:spLocks noGrp="1"/>
+          </p:cNvSpPr>
+          <p:nvPr>
+            <p:ph type="title"/>
+          </p:nvPr>
+        </p:nvSpPr>
+        <p:spPr/>
+        <p:txBody>
+          <a:bodyPr>
+            <a:normAutofit/>
+          </a:bodyPr>
+          <a:lstStyle/>
+          <a:p>
+            <a:r>
+              <a:rPr lang="bg-BG" dirty="0"/>
+              <a:t>Реализация на проекта</a:t>
+            </a:r>
+          </a:p>
+        </p:txBody>
+      </p:sp>
+      <p:sp>
+        <p:nvSpPr>
+          <p:cNvPr id="3" name="Content Placeholder 2"/>
+          <p:cNvSpPr>
+            <a:spLocks noGrp="1"/>
+          </p:cNvSpPr>
+          <p:nvPr>
+            <p:ph idx="1"/>
+          </p:nvPr>
+        </p:nvSpPr>
+        <p:spPr/>
+        <p:txBody>
+          <a:bodyPr/>
+          <a:lstStyle/>
+          <a:p>
+            <a:r>
+              <a:rPr lang="bg-BG" dirty="0" smtClean="0"/>
+              <a:t>Приложен сървър:</a:t>
+            </a:r>
+            <a:endParaRPr lang="en-US" dirty="0" smtClean="0"/>
+          </a:p>
+          <a:p>
+            <a:endParaRPr lang="en-US" dirty="0"/>
+          </a:p>
+          <a:p>
+            <a:endParaRPr lang="bg-BG" dirty="0"/>
+          </a:p>
+        </p:txBody>
+      </p:sp>
+      <p:pic>
+        <p:nvPicPr>
+          <p:cNvPr id="3074" name="Picture 2"/>
+          <p:cNvPicPr>
+            <a:picLocks noChangeAspect="1" noChangeArrowheads="1"/>
+          </p:cNvPicPr>
+          <p:nvPr/>
+        </p:nvPicPr>
+        <p:blipFill>
+          <a:blip r:embed="rId2">
+            <a:extLst>
+              <a:ext uri="{28A0092B-C50C-407E-A947-70E740481C1C}">
+                <a14:useLocalDpi xmlns:a14="http://schemas.microsoft.com/office/drawing/2010/main" val="0"/>
+              </a:ext>
+            </a:extLst>
+          </a:blip>
+          <a:srcRect/>
+          <a:stretch>
+            <a:fillRect/>
+          </a:stretch>
+        </p:blipFill>
+        <p:spPr bwMode="auto">
+          <a:xfrm>
+            <a:off x="2020888" y="2438400"/>
+            <a:ext cx="5153025" cy="3276600"/>
+          </a:xfrm>
+          <a:prstGeom prst="rect">
+            <a:avLst/>
+          </a:prstGeom>
+          <a:noFill/>
+          <a:ln>
+            <a:noFill/>
+          </a:ln>
+          <a:extLst>
+            <a:ext uri="{909E8E84-426E-40DD-AFC4-6F175D3DCCD1}">
+              <a14:hiddenFill xmlns:a14="http://schemas.microsoft.com/office/drawing/2010/main">
+                <a:solidFill>
+                  <a:schemeClr val="accent1"/>
+                </a:solidFill>
+              </a14:hiddenFill>
+            </a:ext>
+            <a:ext uri="{91240B29-F687-4F45-9708-019B960494DF}">
+              <a14:hiddenLine xmlns:a14="http://schemas.microsoft.com/office/drawing/2010/main" w="9525">
+                <a:solidFill>
+                  <a:schemeClr val="tx1"/>
+                </a:solidFill>
+                <a:miter lim="800000"/>
+                <a:headEnd/>
+                <a:tailEnd/>
+              </a14:hiddenLine>
+            </a:ext>
+          </a:extLst>
+        </p:spPr>
+      </p:pic>
+    </p:spTree>
+    <p:extLst>
+      <p:ext uri="{BB962C8B-B14F-4D97-AF65-F5344CB8AC3E}">
+        <p14:creationId xmlns:p14="http://schemas.microsoft.com/office/powerpoint/2010/main" val="3025845103"/>
+      </p:ext>
+    </p:extLst>
+  </p:cSld>
+  <p:clrMapOvr>
+    <a:masterClrMapping/>
+  </p:clrMapOvr>
+  <p:timing>
+    <p:tnLst>
+      <p:par>
+        <p:cTn id="1" dur="indefinite" restart="never" nodeType="tmRoot"/>
+      </p:par>
+    </p:tnLst>
+  </p:timing>
+</p:sld>
+</file>
+
+<file path=ppt/slides/slide9.xml><?xml version="1.0" encoding="utf-8"?>
+<p:sld xmlns:a="http://schemas.openxmlformats.org/drawingml/2006/main" xmlns:r="http://schemas.openxmlformats.org/officeDocument/2006/relationships" xmlns:p="http://schemas.openxmlformats.org/presentationml/2006/main">
+  <p:cSld>
+    <p:spTree>
+      <p:nvGrpSpPr>
+        <p:cNvPr id="1" name=""/>
+        <p:cNvGrpSpPr/>
+        <p:nvPr/>
+      </p:nvGrpSpPr>
+      <p:grpSpPr>
+        <a:xfrm>
+          <a:off x="0" y="0"/>
+          <a:ext cx="0" cy="0"/>
+          <a:chOff x="0" y="0"/>
+          <a:chExt cx="0" cy="0"/>
+        </a:xfrm>
+      </p:grpSpPr>
+      <p:sp>
+        <p:nvSpPr>
+          <p:cNvPr id="2" name="Title 1"/>
+          <p:cNvSpPr>
+            <a:spLocks noGrp="1"/>
+          </p:cNvSpPr>
+          <p:nvPr>
+            <p:ph type="title"/>
+          </p:nvPr>
+        </p:nvSpPr>
+        <p:spPr/>
+        <p:txBody>
+          <a:bodyPr>
+            <a:normAutofit/>
+          </a:bodyPr>
+          <a:lstStyle/>
+          <a:p>
+            <a:r>
+              <a:rPr lang="bg-BG" dirty="0"/>
+              <a:t>Реализация на проекта</a:t>
+            </a:r>
+          </a:p>
+        </p:txBody>
+      </p:sp>
+      <p:sp>
+        <p:nvSpPr>
+          <p:cNvPr id="3" name="Content Placeholder 2"/>
+          <p:cNvSpPr>
+            <a:spLocks noGrp="1"/>
+          </p:cNvSpPr>
+          <p:nvPr>
+            <p:ph idx="1"/>
+          </p:nvPr>
+        </p:nvSpPr>
+        <p:spPr/>
+        <p:txBody>
+          <a:bodyPr/>
+          <a:lstStyle/>
+          <a:p>
+            <a:r>
+              <a:rPr lang="bg-BG" dirty="0" smtClean="0"/>
+              <a:t>Приложение към приложния сървър:</a:t>
+            </a:r>
+            <a:endParaRPr lang="en-US" dirty="0" smtClean="0"/>
+          </a:p>
+          <a:p>
+            <a:endParaRPr lang="en-US" dirty="0"/>
+          </a:p>
+          <a:p>
+            <a:endParaRPr lang="bg-BG" dirty="0"/>
+          </a:p>
+        </p:txBody>
+      </p:sp>
+      <p:pic>
+        <p:nvPicPr>
+          <p:cNvPr id="12290" name="Picture 2"/>
+          <p:cNvPicPr>
+            <a:picLocks noChangeAspect="1" noChangeArrowheads="1"/>
+          </p:cNvPicPr>
+          <p:nvPr/>
+        </p:nvPicPr>
+        <p:blipFill>
+          <a:blip r:embed="rId2">
+            <a:extLst>
+              <a:ext uri="{28A0092B-C50C-407E-A947-70E740481C1C}">
+                <a14:useLocalDpi xmlns:a14="http://schemas.microsoft.com/office/drawing/2010/main" val="0"/>
+              </a:ext>
+            </a:extLst>
+          </a:blip>
+          <a:srcRect/>
+          <a:stretch>
+            <a:fillRect/>
+          </a:stretch>
+        </p:blipFill>
+        <p:spPr bwMode="auto">
+          <a:xfrm>
+            <a:off x="1524000" y="2438400"/>
+            <a:ext cx="5676900" cy="3352800"/>
+          </a:xfrm>
+          <a:prstGeom prst="rect">
+            <a:avLst/>
+          </a:prstGeom>
+          <a:noFill/>
+          <a:ln>
+            <a:noFill/>
+          </a:ln>
+          <a:extLst>
+            <a:ext uri="{909E8E84-426E-40DD-AFC4-6F175D3DCCD1}">
+              <a14:hiddenFill xmlns:a14="http://schemas.microsoft.com/office/drawing/2010/main">
+                <a:solidFill>
+                  <a:schemeClr val="accent1"/>
+                </a:solidFill>
+              </a14:hiddenFill>
+            </a:ext>
+            <a:ext uri="{91240B29-F687-4F45-9708-019B960494DF}">
+              <a14:hiddenLine xmlns:a14="http://schemas.microsoft.com/office/drawing/2010/main" w="9525">
+                <a:solidFill>
+                  <a:schemeClr val="tx1"/>
+                </a:solidFill>
+                <a:miter lim="800000"/>
+                <a:headEnd/>
+                <a:tailEnd/>
+              </a14:hiddenLine>
+            </a:ext>
+          </a:extLst>
+        </p:spPr>
+      </p:pic>
+    </p:spTree>
+    <p:extLst>
+      <p:ext uri="{BB962C8B-B14F-4D97-AF65-F5344CB8AC3E}">
+        <p14:creationId xmlns:p14="http://schemas.microsoft.com/office/powerpoint/2010/main" val="2822023787"/>
+      </p:ext>
+    </p:extLst>
+  </p:cSld>
+  <p:clrMapOvr>
+    <a:masterClrMapping/>
+  </p:clrMapOvr>
+  <p:timing>
+    <p:tnLst>
+      <p:par>
+        <p:cTn id="1" dur="indefinite" restart="never" nodeType="tmRoot"/>
+      </p:par>
+    </p:tnLst>
+  </p:timing>
 </p:sld>
 </file>
 

</xml_diff>

<commit_message>
Added implementation of the application server; Added changes to the documentation of the project.
</commit_message>
<xml_diff>
--- a/docs/presentations/Grading Ecosystem - Overview.pptx
+++ b/docs/presentations/Grading Ecosystem - Overview.pptx
@@ -304,7 +304,7 @@
             <a:fld id="{1D8BD707-D9CF-40AE-B4C6-C98DA3205C09}" type="datetimeFigureOut">
               <a:rPr lang="en-US" smtClean="0"/>
               <a:pPr/>
-              <a:t>10/27/2013</a:t>
+              <a:t>1/30/2014</a:t>
             </a:fld>
             <a:endParaRPr lang="en-US"/>
           </a:p>
@@ -478,7 +478,7 @@
             <a:fld id="{1D8BD707-D9CF-40AE-B4C6-C98DA3205C09}" type="datetimeFigureOut">
               <a:rPr lang="en-US" smtClean="0"/>
               <a:pPr/>
-              <a:t>10/27/2013</a:t>
+              <a:t>1/30/2014</a:t>
             </a:fld>
             <a:endParaRPr lang="en-US"/>
           </a:p>
@@ -655,7 +655,7 @@
             <a:fld id="{1D8BD707-D9CF-40AE-B4C6-C98DA3205C09}" type="datetimeFigureOut">
               <a:rPr lang="en-US" smtClean="0"/>
               <a:pPr/>
-              <a:t>10/27/2013</a:t>
+              <a:t>1/30/2014</a:t>
             </a:fld>
             <a:endParaRPr lang="en-US"/>
           </a:p>
@@ -822,7 +822,7 @@
             <a:fld id="{1D8BD707-D9CF-40AE-B4C6-C98DA3205C09}" type="datetimeFigureOut">
               <a:rPr lang="en-US" smtClean="0"/>
               <a:pPr/>
-              <a:t>10/27/2013</a:t>
+              <a:t>1/30/2014</a:t>
             </a:fld>
             <a:endParaRPr lang="en-US"/>
           </a:p>
@@ -1065,7 +1065,7 @@
             <a:fld id="{1D8BD707-D9CF-40AE-B4C6-C98DA3205C09}" type="datetimeFigureOut">
               <a:rPr lang="en-US" smtClean="0"/>
               <a:pPr/>
-              <a:t>10/27/2013</a:t>
+              <a:t>1/30/2014</a:t>
             </a:fld>
             <a:endParaRPr lang="en-US"/>
           </a:p>
@@ -1350,7 +1350,7 @@
             <a:fld id="{1D8BD707-D9CF-40AE-B4C6-C98DA3205C09}" type="datetimeFigureOut">
               <a:rPr lang="en-US" smtClean="0"/>
               <a:pPr/>
-              <a:t>10/27/2013</a:t>
+              <a:t>1/30/2014</a:t>
             </a:fld>
             <a:endParaRPr lang="en-US"/>
           </a:p>
@@ -1769,7 +1769,7 @@
             <a:fld id="{1D8BD707-D9CF-40AE-B4C6-C98DA3205C09}" type="datetimeFigureOut">
               <a:rPr lang="en-US" smtClean="0"/>
               <a:pPr/>
-              <a:t>10/27/2013</a:t>
+              <a:t>1/30/2014</a:t>
             </a:fld>
             <a:endParaRPr lang="en-US"/>
           </a:p>
@@ -1884,7 +1884,7 @@
             <a:fld id="{1D8BD707-D9CF-40AE-B4C6-C98DA3205C09}" type="datetimeFigureOut">
               <a:rPr lang="en-US" smtClean="0"/>
               <a:pPr/>
-              <a:t>10/27/2013</a:t>
+              <a:t>1/30/2014</a:t>
             </a:fld>
             <a:endParaRPr lang="en-US"/>
           </a:p>
@@ -1976,7 +1976,7 @@
             <a:fld id="{1D8BD707-D9CF-40AE-B4C6-C98DA3205C09}" type="datetimeFigureOut">
               <a:rPr lang="en-US" smtClean="0"/>
               <a:pPr/>
-              <a:t>10/27/2013</a:t>
+              <a:t>1/30/2014</a:t>
             </a:fld>
             <a:endParaRPr lang="en-US"/>
           </a:p>
@@ -2250,7 +2250,7 @@
             <a:fld id="{1D8BD707-D9CF-40AE-B4C6-C98DA3205C09}" type="datetimeFigureOut">
               <a:rPr lang="en-US" smtClean="0"/>
               <a:pPr/>
-              <a:t>10/27/2013</a:t>
+              <a:t>1/30/2014</a:t>
             </a:fld>
             <a:endParaRPr lang="en-US"/>
           </a:p>
@@ -2500,7 +2500,7 @@
             <a:fld id="{1D8BD707-D9CF-40AE-B4C6-C98DA3205C09}" type="datetimeFigureOut">
               <a:rPr lang="en-US" smtClean="0"/>
               <a:pPr/>
-              <a:t>10/27/2013</a:t>
+              <a:t>1/30/2014</a:t>
             </a:fld>
             <a:endParaRPr lang="en-US"/>
           </a:p>
@@ -2710,7 +2710,7 @@
             <a:fld id="{1D8BD707-D9CF-40AE-B4C6-C98DA3205C09}" type="datetimeFigureOut">
               <a:rPr lang="en-US" smtClean="0"/>
               <a:pPr/>
-              <a:t>10/27/2013</a:t>
+              <a:t>1/30/2014</a:t>
             </a:fld>
             <a:endParaRPr lang="en-US"/>
           </a:p>
@@ -3191,28 +3191,19 @@
               <a:rPr lang="bg-BG" dirty="0" smtClean="0"/>
               <a:t>д-р Георги Георгиев</a:t>
             </a:r>
-            <a:endParaRPr lang="bg-BG" dirty="0" smtClean="0"/>
           </a:p>
           <a:p>
             <a:pPr algn="l"/>
             <a:r>
               <a:rPr lang="bg-BG" dirty="0" smtClean="0"/>
-              <a:t>Мартин </a:t>
-            </a:r>
+              <a:t>Мартин Тошев</a:t>
+            </a:r>
+          </a:p>
+          <a:p>
+            <a:pPr algn="l"/>
             <a:r>
               <a:rPr lang="bg-BG" dirty="0" smtClean="0"/>
-              <a:t>Тошев</a:t>
-            </a:r>
-          </a:p>
-          <a:p>
-            <a:pPr algn="l"/>
-            <a:r>
-              <a:rPr lang="bg-BG" dirty="0" smtClean="0"/>
-              <a:t>Орлин </a:t>
-            </a:r>
-            <a:r>
-              <a:rPr lang="bg-BG" dirty="0" smtClean="0"/>
-              <a:t>Тенчев</a:t>
+              <a:t>Орлин Тенчев</a:t>
             </a:r>
             <a:endParaRPr lang="en-US" dirty="0" smtClean="0"/>
           </a:p>
@@ -4966,7 +4957,7 @@
           <a:graphicData uri="http://schemas.openxmlformats.org/presentationml/2006/ole">
             <mc:AlternateContent xmlns:mc="http://schemas.openxmlformats.org/markup-compatibility/2006">
               <mc:Choice xmlns:v="urn:schemas-microsoft-com:vml" Requires="v">
-                <p:oleObj spid="_x0000_s11304" name="Visio" r:id="rId3" imgW="5231527" imgH="1588829" progId="Visio.Drawing.11">
+                <p:oleObj spid="_x0000_s11305" name="Visio" r:id="rId3" imgW="5231527" imgH="1588829" progId="Visio.Drawing.11">
                   <p:embed/>
                 </p:oleObj>
               </mc:Choice>

</xml_diff>